<commit_message>
Fixes from last night
</commit_message>
<xml_diff>
--- a/Connect4.pptx
+++ b/Connect4.pptx
@@ -214,7 +214,7 @@
           <a:p>
             <a:fld id="{FF6F425D-DEA3-43AE-8BD4-73C15BA73D62}" type="datetimeFigureOut">
               <a:rPr lang="en-GB" smtClean="0"/>
-              <a:t>11/10/2016</a:t>
+              <a:t>12/10/2016</a:t>
             </a:fld>
             <a:endParaRPr lang="en-GB"/>
           </a:p>
@@ -570,6 +570,94 @@
 </p:notes>
 </file>
 
+<file path=ppt/notesSlides/notesSlide10.xml><?xml version="1.0" encoding="utf-8"?>
+<p:notes xmlns:a="http://schemas.openxmlformats.org/drawingml/2006/main" xmlns:r="http://schemas.openxmlformats.org/officeDocument/2006/relationships" xmlns:p="http://schemas.openxmlformats.org/presentationml/2006/main">
+  <p:cSld>
+    <p:spTree>
+      <p:nvGrpSpPr>
+        <p:cNvPr id="1" name=""/>
+        <p:cNvGrpSpPr/>
+        <p:nvPr/>
+      </p:nvGrpSpPr>
+      <p:grpSpPr>
+        <a:xfrm>
+          <a:off x="0" y="0"/>
+          <a:ext cx="0" cy="0"/>
+          <a:chOff x="0" y="0"/>
+          <a:chExt cx="0" cy="0"/>
+        </a:xfrm>
+      </p:grpSpPr>
+      <p:sp>
+        <p:nvSpPr>
+          <p:cNvPr id="2" name="Slide Image Placeholder 1"/>
+          <p:cNvSpPr>
+            <a:spLocks noGrp="1" noRot="1" noChangeAspect="1"/>
+          </p:cNvSpPr>
+          <p:nvPr>
+            <p:ph type="sldImg"/>
+          </p:nvPr>
+        </p:nvSpPr>
+        <p:spPr/>
+      </p:sp>
+      <p:sp>
+        <p:nvSpPr>
+          <p:cNvPr id="3" name="Notes Placeholder 2"/>
+          <p:cNvSpPr>
+            <a:spLocks noGrp="1"/>
+          </p:cNvSpPr>
+          <p:nvPr>
+            <p:ph type="body" idx="1"/>
+          </p:nvPr>
+        </p:nvSpPr>
+        <p:spPr/>
+        <p:txBody>
+          <a:bodyPr/>
+          <a:lstStyle/>
+          <a:p>
+            <a:r>
+              <a:rPr lang="en-GB" dirty="0" smtClean="0"/>
+              <a:t>Time permitting</a:t>
+            </a:r>
+            <a:endParaRPr lang="en-GB" dirty="0"/>
+          </a:p>
+        </p:txBody>
+      </p:sp>
+      <p:sp>
+        <p:nvSpPr>
+          <p:cNvPr id="4" name="Slide Number Placeholder 3"/>
+          <p:cNvSpPr>
+            <a:spLocks noGrp="1"/>
+          </p:cNvSpPr>
+          <p:nvPr>
+            <p:ph type="sldNum" sz="quarter" idx="10"/>
+          </p:nvPr>
+        </p:nvSpPr>
+        <p:spPr/>
+        <p:txBody>
+          <a:bodyPr/>
+          <a:lstStyle/>
+          <a:p>
+            <a:fld id="{723B45EE-AF0F-4566-84E6-937F0AB40E53}" type="slidenum">
+              <a:rPr lang="en-GB" smtClean="0"/>
+              <a:t>15</a:t>
+            </a:fld>
+            <a:endParaRPr lang="en-GB"/>
+          </a:p>
+        </p:txBody>
+      </p:sp>
+    </p:spTree>
+    <p:extLst>
+      <p:ext uri="{BB962C8B-B14F-4D97-AF65-F5344CB8AC3E}">
+        <p14:creationId xmlns:p14="http://schemas.microsoft.com/office/powerpoint/2010/main" val="3191459087"/>
+      </p:ext>
+    </p:extLst>
+  </p:cSld>
+  <p:clrMapOvr>
+    <a:masterClrMapping/>
+  </p:clrMapOvr>
+</p:notes>
+</file>
+
 <file path=ppt/notesSlides/notesSlide2.xml><?xml version="1.0" encoding="utf-8"?>
 <p:notes xmlns:a="http://schemas.openxmlformats.org/drawingml/2006/main" xmlns:r="http://schemas.openxmlformats.org/officeDocument/2006/relationships" xmlns:p="http://schemas.openxmlformats.org/presentationml/2006/main">
   <p:cSld>
@@ -960,48 +1048,26 @@
           <a:p>
             <a:r>
               <a:rPr lang="en-GB" dirty="0" smtClean="0"/>
-              <a:t>Each node</a:t>
+              <a:t>0,0 is bottom left</a:t>
+            </a:r>
+          </a:p>
+          <a:p>
+            <a:r>
+              <a:rPr lang="en-GB" dirty="0" smtClean="0"/>
+              <a:t>7</a:t>
             </a:r>
             <a:r>
               <a:rPr lang="en-GB" baseline="0" dirty="0" smtClean="0"/>
-              <a:t> in the tree is a game position.</a:t>
+              <a:t> columns</a:t>
             </a:r>
           </a:p>
           <a:p>
             <a:r>
               <a:rPr lang="en-GB" baseline="0" dirty="0" smtClean="0"/>
-              <a:t>For the root node we have 7 possible moves.  So we have 7 branches</a:t>
-            </a:r>
-          </a:p>
-          <a:p>
-            <a:r>
-              <a:rPr lang="en-GB" baseline="0" dirty="0" smtClean="0"/>
-              <a:t>What is the maximum depth of the tree?  41</a:t>
-            </a:r>
-          </a:p>
-          <a:p>
-            <a:r>
-              <a:rPr lang="en-GB" baseline="0" dirty="0" smtClean="0"/>
-              <a:t>Upper bound of the tree size?  7 ^ 41</a:t>
-            </a:r>
-          </a:p>
-          <a:p>
-            <a:r>
-              <a:rPr lang="en-GB" baseline="0" dirty="0" smtClean="0"/>
-              <a:t>Draw max/min on different levels</a:t>
-            </a:r>
-          </a:p>
-          <a:p>
-            <a:r>
-              <a:rPr lang="en-GB" baseline="0" dirty="0" smtClean="0"/>
-              <a:t>Place values against leaf nodes</a:t>
-            </a:r>
-          </a:p>
-          <a:p>
-            <a:r>
-              <a:rPr lang="en-GB" baseline="0" dirty="0" smtClean="0"/>
-              <a:t>Work up</a:t>
-            </a:r>
+              <a:t>6 rows</a:t>
+            </a:r>
+          </a:p>
+          <a:p>
             <a:endParaRPr lang="en-GB" dirty="0"/>
           </a:p>
         </p:txBody>
@@ -1023,7 +1089,7 @@
           <a:p>
             <a:fld id="{723B45EE-AF0F-4566-84E6-937F0AB40E53}" type="slidenum">
               <a:rPr lang="en-GB" smtClean="0"/>
-              <a:t>13</a:t>
+              <a:t>9</a:t>
             </a:fld>
             <a:endParaRPr lang="en-GB"/>
           </a:p>
@@ -1032,7 +1098,7 @@
     </p:spTree>
     <p:extLst>
       <p:ext uri="{BB962C8B-B14F-4D97-AF65-F5344CB8AC3E}">
-        <p14:creationId xmlns:p14="http://schemas.microsoft.com/office/powerpoint/2010/main" val="2280298299"/>
+        <p14:creationId xmlns:p14="http://schemas.microsoft.com/office/powerpoint/2010/main" val="944894978"/>
       </p:ext>
     </p:extLst>
   </p:cSld>
@@ -1086,22 +1152,6 @@
           <a:bodyPr/>
           <a:lstStyle/>
           <a:p>
-            <a:r>
-              <a:rPr lang="en-GB" dirty="0" smtClean="0"/>
-              <a:t>If you get time,  then this </a:t>
-            </a:r>
-            <a:r>
-              <a:rPr lang="en-GB" dirty="0" err="1" smtClean="0"/>
-              <a:t>optomisation</a:t>
-            </a:r>
-            <a:r>
-              <a:rPr lang="en-GB" dirty="0" smtClean="0"/>
-              <a:t> will speed up the</a:t>
-            </a:r>
-            <a:r>
-              <a:rPr lang="en-GB" baseline="0" dirty="0" smtClean="0"/>
-              <a:t> search dramatically.</a:t>
-            </a:r>
             <a:endParaRPr lang="en-GB" dirty="0"/>
           </a:p>
         </p:txBody>
@@ -1123,7 +1173,7 @@
           <a:p>
             <a:fld id="{723B45EE-AF0F-4566-84E6-937F0AB40E53}" type="slidenum">
               <a:rPr lang="en-GB" smtClean="0"/>
-              <a:t>14</a:t>
+              <a:t>12</a:t>
             </a:fld>
             <a:endParaRPr lang="en-GB"/>
           </a:p>
@@ -1132,7 +1182,7 @@
     </p:spTree>
     <p:extLst>
       <p:ext uri="{BB962C8B-B14F-4D97-AF65-F5344CB8AC3E}">
-        <p14:creationId xmlns:p14="http://schemas.microsoft.com/office/powerpoint/2010/main" val="2408779161"/>
+        <p14:creationId xmlns:p14="http://schemas.microsoft.com/office/powerpoint/2010/main" val="2418937918"/>
       </p:ext>
     </p:extLst>
   </p:cSld>
@@ -1188,7 +1238,47 @@
           <a:p>
             <a:r>
               <a:rPr lang="en-GB" dirty="0" smtClean="0"/>
-              <a:t>Time permitting</a:t>
+              <a:t>Each node</a:t>
+            </a:r>
+            <a:r>
+              <a:rPr lang="en-GB" baseline="0" dirty="0" smtClean="0"/>
+              <a:t> in the tree is a game position.</a:t>
+            </a:r>
+          </a:p>
+          <a:p>
+            <a:r>
+              <a:rPr lang="en-GB" baseline="0" dirty="0" smtClean="0"/>
+              <a:t>For the root node we have 7 possible moves.  So we have 7 branches</a:t>
+            </a:r>
+          </a:p>
+          <a:p>
+            <a:r>
+              <a:rPr lang="en-GB" baseline="0" dirty="0" smtClean="0"/>
+              <a:t>What is the maximum depth of the tree?  41</a:t>
+            </a:r>
+          </a:p>
+          <a:p>
+            <a:r>
+              <a:rPr lang="en-GB" baseline="0" dirty="0" smtClean="0"/>
+              <a:t>Upper bound of the tree size?  7 ^ 41</a:t>
+            </a:r>
+          </a:p>
+          <a:p>
+            <a:r>
+              <a:rPr lang="en-GB" baseline="0" dirty="0" smtClean="0"/>
+              <a:t>Draw max/min on different levels</a:t>
+            </a:r>
+          </a:p>
+          <a:p>
+            <a:r>
+              <a:rPr lang="en-GB" baseline="0" dirty="0" smtClean="0"/>
+              <a:t>Place values against leaf nodes</a:t>
+            </a:r>
+          </a:p>
+          <a:p>
+            <a:r>
+              <a:rPr lang="en-GB" baseline="0" dirty="0" smtClean="0"/>
+              <a:t>Work up</a:t>
             </a:r>
             <a:endParaRPr lang="en-GB" dirty="0"/>
           </a:p>
@@ -1211,7 +1301,7 @@
           <a:p>
             <a:fld id="{723B45EE-AF0F-4566-84E6-937F0AB40E53}" type="slidenum">
               <a:rPr lang="en-GB" smtClean="0"/>
-              <a:t>15</a:t>
+              <a:t>13</a:t>
             </a:fld>
             <a:endParaRPr lang="en-GB"/>
           </a:p>
@@ -1220,7 +1310,107 @@
     </p:spTree>
     <p:extLst>
       <p:ext uri="{BB962C8B-B14F-4D97-AF65-F5344CB8AC3E}">
-        <p14:creationId xmlns:p14="http://schemas.microsoft.com/office/powerpoint/2010/main" val="3191459087"/>
+        <p14:creationId xmlns:p14="http://schemas.microsoft.com/office/powerpoint/2010/main" val="2280298299"/>
+      </p:ext>
+    </p:extLst>
+  </p:cSld>
+  <p:clrMapOvr>
+    <a:masterClrMapping/>
+  </p:clrMapOvr>
+</p:notes>
+</file>
+
+<file path=ppt/notesSlides/notesSlide9.xml><?xml version="1.0" encoding="utf-8"?>
+<p:notes xmlns:a="http://schemas.openxmlformats.org/drawingml/2006/main" xmlns:r="http://schemas.openxmlformats.org/officeDocument/2006/relationships" xmlns:p="http://schemas.openxmlformats.org/presentationml/2006/main">
+  <p:cSld>
+    <p:spTree>
+      <p:nvGrpSpPr>
+        <p:cNvPr id="1" name=""/>
+        <p:cNvGrpSpPr/>
+        <p:nvPr/>
+      </p:nvGrpSpPr>
+      <p:grpSpPr>
+        <a:xfrm>
+          <a:off x="0" y="0"/>
+          <a:ext cx="0" cy="0"/>
+          <a:chOff x="0" y="0"/>
+          <a:chExt cx="0" cy="0"/>
+        </a:xfrm>
+      </p:grpSpPr>
+      <p:sp>
+        <p:nvSpPr>
+          <p:cNvPr id="2" name="Slide Image Placeholder 1"/>
+          <p:cNvSpPr>
+            <a:spLocks noGrp="1" noRot="1" noChangeAspect="1"/>
+          </p:cNvSpPr>
+          <p:nvPr>
+            <p:ph type="sldImg"/>
+          </p:nvPr>
+        </p:nvSpPr>
+        <p:spPr/>
+      </p:sp>
+      <p:sp>
+        <p:nvSpPr>
+          <p:cNvPr id="3" name="Notes Placeholder 2"/>
+          <p:cNvSpPr>
+            <a:spLocks noGrp="1"/>
+          </p:cNvSpPr>
+          <p:nvPr>
+            <p:ph type="body" idx="1"/>
+          </p:nvPr>
+        </p:nvSpPr>
+        <p:spPr/>
+        <p:txBody>
+          <a:bodyPr/>
+          <a:lstStyle/>
+          <a:p>
+            <a:r>
+              <a:rPr lang="en-GB" dirty="0" smtClean="0"/>
+              <a:t>If you get time,  then this </a:t>
+            </a:r>
+            <a:r>
+              <a:rPr lang="en-GB" dirty="0" err="1" smtClean="0"/>
+              <a:t>optomisation</a:t>
+            </a:r>
+            <a:r>
+              <a:rPr lang="en-GB" dirty="0" smtClean="0"/>
+              <a:t> will speed up the</a:t>
+            </a:r>
+            <a:r>
+              <a:rPr lang="en-GB" baseline="0" dirty="0" smtClean="0"/>
+              <a:t> search dramatically.</a:t>
+            </a:r>
+            <a:endParaRPr lang="en-GB" dirty="0"/>
+          </a:p>
+        </p:txBody>
+      </p:sp>
+      <p:sp>
+        <p:nvSpPr>
+          <p:cNvPr id="4" name="Slide Number Placeholder 3"/>
+          <p:cNvSpPr>
+            <a:spLocks noGrp="1"/>
+          </p:cNvSpPr>
+          <p:nvPr>
+            <p:ph type="sldNum" sz="quarter" idx="10"/>
+          </p:nvPr>
+        </p:nvSpPr>
+        <p:spPr/>
+        <p:txBody>
+          <a:bodyPr/>
+          <a:lstStyle/>
+          <a:p>
+            <a:fld id="{723B45EE-AF0F-4566-84E6-937F0AB40E53}" type="slidenum">
+              <a:rPr lang="en-GB" smtClean="0"/>
+              <a:t>14</a:t>
+            </a:fld>
+            <a:endParaRPr lang="en-GB"/>
+          </a:p>
+        </p:txBody>
+      </p:sp>
+    </p:spTree>
+    <p:extLst>
+      <p:ext uri="{BB962C8B-B14F-4D97-AF65-F5344CB8AC3E}">
+        <p14:creationId xmlns:p14="http://schemas.microsoft.com/office/powerpoint/2010/main" val="2408779161"/>
       </p:ext>
     </p:extLst>
   </p:cSld>
@@ -1375,7 +1565,7 @@
           <a:p>
             <a:fld id="{8C2DC95F-4758-45CC-8E65-674D23536E7F}" type="datetimeFigureOut">
               <a:rPr lang="en-GB" smtClean="0"/>
-              <a:t>11/10/2016</a:t>
+              <a:t>12/10/2016</a:t>
             </a:fld>
             <a:endParaRPr lang="en-GB"/>
           </a:p>
@@ -1585,7 +1775,7 @@
           <a:p>
             <a:fld id="{8C2DC95F-4758-45CC-8E65-674D23536E7F}" type="datetimeFigureOut">
               <a:rPr lang="en-GB" smtClean="0"/>
-              <a:t>11/10/2016</a:t>
+              <a:t>12/10/2016</a:t>
             </a:fld>
             <a:endParaRPr lang="en-GB"/>
           </a:p>
@@ -1795,7 +1985,7 @@
           <a:p>
             <a:fld id="{8C2DC95F-4758-45CC-8E65-674D23536E7F}" type="datetimeFigureOut">
               <a:rPr lang="en-GB" smtClean="0"/>
-              <a:t>11/10/2016</a:t>
+              <a:t>12/10/2016</a:t>
             </a:fld>
             <a:endParaRPr lang="en-GB"/>
           </a:p>
@@ -2071,7 +2261,7 @@
           <a:p>
             <a:fld id="{8C2DC95F-4758-45CC-8E65-674D23536E7F}" type="datetimeFigureOut">
               <a:rPr lang="en-GB" smtClean="0"/>
-              <a:t>11/10/2016</a:t>
+              <a:t>12/10/2016</a:t>
             </a:fld>
             <a:endParaRPr lang="en-GB"/>
           </a:p>
@@ -2341,7 +2531,7 @@
           <a:p>
             <a:fld id="{8C2DC95F-4758-45CC-8E65-674D23536E7F}" type="datetimeFigureOut">
               <a:rPr lang="en-GB" smtClean="0"/>
-              <a:t>11/10/2016</a:t>
+              <a:t>12/10/2016</a:t>
             </a:fld>
             <a:endParaRPr lang="en-GB"/>
           </a:p>
@@ -2747,7 +2937,7 @@
           <a:p>
             <a:fld id="{8C2DC95F-4758-45CC-8E65-674D23536E7F}" type="datetimeFigureOut">
               <a:rPr lang="en-GB" smtClean="0"/>
-              <a:t>11/10/2016</a:t>
+              <a:t>12/10/2016</a:t>
             </a:fld>
             <a:endParaRPr lang="en-GB"/>
           </a:p>
@@ -2897,7 +3087,7 @@
           <a:p>
             <a:fld id="{8C2DC95F-4758-45CC-8E65-674D23536E7F}" type="datetimeFigureOut">
               <a:rPr lang="en-GB" smtClean="0"/>
-              <a:t>11/10/2016</a:t>
+              <a:t>12/10/2016</a:t>
             </a:fld>
             <a:endParaRPr lang="en-GB"/>
           </a:p>
@@ -3016,7 +3206,7 @@
           <a:p>
             <a:fld id="{8C2DC95F-4758-45CC-8E65-674D23536E7F}" type="datetimeFigureOut">
               <a:rPr lang="en-GB" smtClean="0"/>
-              <a:t>11/10/2016</a:t>
+              <a:t>12/10/2016</a:t>
             </a:fld>
             <a:endParaRPr lang="en-GB"/>
           </a:p>
@@ -3326,7 +3516,7 @@
           <a:p>
             <a:fld id="{8C2DC95F-4758-45CC-8E65-674D23536E7F}" type="datetimeFigureOut">
               <a:rPr lang="en-GB" smtClean="0"/>
-              <a:t>11/10/2016</a:t>
+              <a:t>12/10/2016</a:t>
             </a:fld>
             <a:endParaRPr lang="en-GB"/>
           </a:p>
@@ -3616,7 +3806,7 @@
           <a:p>
             <a:fld id="{8C2DC95F-4758-45CC-8E65-674D23536E7F}" type="datetimeFigureOut">
               <a:rPr lang="en-GB" smtClean="0"/>
-              <a:t>11/10/2016</a:t>
+              <a:t>12/10/2016</a:t>
             </a:fld>
             <a:endParaRPr lang="en-GB"/>
           </a:p>
@@ -4684,16 +4874,17 @@
           <a:p>
             <a:r>
               <a:rPr lang="en-GB" dirty="0" smtClean="0"/>
-              <a:t>Monte-</a:t>
-            </a:r>
-            <a:r>
-              <a:rPr lang="en-GB" dirty="0" err="1" smtClean="0"/>
-              <a:t>carlo</a:t>
-            </a:r>
-            <a:r>
-              <a:rPr lang="en-GB" dirty="0" smtClean="0"/>
-              <a:t>?</a:t>
-            </a:r>
+              <a:t>Monte Carlo</a:t>
+            </a:r>
+            <a:r>
+              <a:rPr lang="en-GB" dirty="0"/>
+              <a:t> </a:t>
+            </a:r>
+            <a:r>
+              <a:rPr lang="en-GB" smtClean="0"/>
+              <a:t>tree search</a:t>
+            </a:r>
+            <a:endParaRPr lang="en-GB" dirty="0" smtClean="0"/>
           </a:p>
           <a:p>
             <a:endParaRPr lang="en-GB" dirty="0"/>
@@ -4997,17 +5188,15 @@
               <a:rPr lang="en-GB" dirty="0" smtClean="0"/>
               <a:t>Play against the server</a:t>
             </a:r>
+          </a:p>
+          <a:p>
             <a:endParaRPr lang="en-GB" dirty="0" smtClean="0"/>
           </a:p>
           <a:p>
-            <a:endParaRPr lang="en-GB" dirty="0" smtClean="0"/>
-          </a:p>
-          <a:p>
             <a:r>
               <a:rPr lang="en-GB" dirty="0" smtClean="0"/>
               <a:t>Show / Contest?  </a:t>
             </a:r>
-            <a:endParaRPr lang="en-GB" dirty="0" smtClean="0"/>
           </a:p>
           <a:p>
             <a:endParaRPr lang="en-GB" dirty="0" smtClean="0"/>
@@ -5117,17 +5306,8 @@
           <a:p>
             <a:r>
               <a:rPr lang="en-GB" dirty="0" smtClean="0"/>
-              <a:t>Players </a:t>
-            </a:r>
-            <a:r>
-              <a:rPr lang="en-GB" dirty="0" smtClean="0"/>
-              <a:t>take it in turns to place a </a:t>
-            </a:r>
-            <a:r>
-              <a:rPr lang="en-GB" dirty="0" smtClean="0"/>
-              <a:t>counter into a column</a:t>
-            </a:r>
-            <a:endParaRPr lang="en-GB" dirty="0" smtClean="0"/>
+              <a:t>Players take it in turns to place a counter into a column</a:t>
+            </a:r>
           </a:p>
           <a:p>
             <a:endParaRPr lang="en-GB" dirty="0" smtClean="0"/>
@@ -5549,7 +5729,15 @@
           <a:p>
             <a:r>
               <a:rPr lang="en-GB" dirty="0" smtClean="0"/>
-              <a:t>The API calls are made using html GET and POST commands</a:t>
+              <a:t>The API calls are made using </a:t>
+            </a:r>
+            <a:r>
+              <a:rPr lang="en-GB" dirty="0" smtClean="0"/>
+              <a:t>http GET </a:t>
+            </a:r>
+            <a:r>
+              <a:rPr lang="en-GB" dirty="0" smtClean="0"/>
+              <a:t>and POST commands</a:t>
             </a:r>
           </a:p>
           <a:p>
@@ -5769,11 +5957,7 @@
           <a:p>
             <a:r>
               <a:rPr lang="en-GB" dirty="0" smtClean="0"/>
-              <a:t>The </a:t>
-            </a:r>
-            <a:r>
-              <a:rPr lang="en-GB" dirty="0" smtClean="0"/>
-              <a:t>Steps</a:t>
+              <a:t>The Steps</a:t>
             </a:r>
             <a:endParaRPr lang="en-GB" dirty="0"/>
           </a:p>
@@ -5855,11 +6039,15 @@
             </a:pPr>
             <a:r>
               <a:rPr lang="en-GB" dirty="0" smtClean="0"/>
-              <a:t>If it is your term then make </a:t>
-            </a:r>
-            <a:r>
-              <a:rPr lang="en-GB" dirty="0" smtClean="0"/>
-              <a:t>your move</a:t>
+              <a:t>If it is your </a:t>
+            </a:r>
+            <a:r>
+              <a:rPr lang="en-GB" dirty="0" smtClean="0"/>
+              <a:t>turn then </a:t>
+            </a:r>
+            <a:r>
+              <a:rPr lang="en-GB" dirty="0" smtClean="0"/>
+              <a:t>make your move</a:t>
             </a:r>
           </a:p>
           <a:p>
@@ -5967,8 +6155,13 @@
           <a:p>
             <a:r>
               <a:rPr lang="en-GB" dirty="0" smtClean="0"/>
-              <a:t>There is some example code in C# which hopefully is easy to read</a:t>
-            </a:r>
+              <a:t>There is some example code in C# </a:t>
+            </a:r>
+            <a:r>
+              <a:rPr lang="en-GB" dirty="0" smtClean="0"/>
+              <a:t>and C++</a:t>
+            </a:r>
+            <a:endParaRPr lang="en-GB" dirty="0" smtClean="0"/>
           </a:p>
           <a:p>
             <a:pPr marL="0" indent="0">
@@ -6001,15 +6194,7 @@
             </a:r>
             <a:r>
               <a:rPr lang="en-GB" dirty="0" smtClean="0"/>
-              <a:t>nd some </a:t>
-            </a:r>
-            <a:r>
-              <a:rPr lang="en-GB" dirty="0" smtClean="0"/>
-              <a:t>details in these slides </a:t>
-            </a:r>
-            <a:r>
-              <a:rPr lang="en-GB" dirty="0" smtClean="0"/>
-              <a:t>if you want to start from scratch</a:t>
+              <a:t>nd some details in these slides if you want to start from scratch</a:t>
             </a:r>
           </a:p>
           <a:p>
@@ -6018,11 +6203,7 @@
           <a:p>
             <a:r>
               <a:rPr lang="en-GB" dirty="0" smtClean="0"/>
-              <a:t>Online help (swagger</a:t>
-            </a:r>
-            <a:r>
-              <a:rPr lang="en-GB" dirty="0" smtClean="0"/>
-              <a:t>)</a:t>
+              <a:t>Online help (swagger)</a:t>
             </a:r>
           </a:p>
           <a:p>
@@ -6789,7 +6970,7 @@
           <p:nvPr/>
         </p:nvPicPr>
         <p:blipFill>
-          <a:blip r:embed="rId2"/>
+          <a:blip r:embed="rId3"/>
           <a:stretch>
             <a:fillRect/>
           </a:stretch>
@@ -6813,7 +6994,7 @@
           <p:nvPr/>
         </p:nvPicPr>
         <p:blipFill>
-          <a:blip r:embed="rId3"/>
+          <a:blip r:embed="rId4"/>
           <a:stretch>
             <a:fillRect/>
           </a:stretch>

</xml_diff>